<commit_message>
Updes to visual style
Previous version of powerpoint doesn't provide as much configuration.
Updated lines and callouts
</commit_message>
<xml_diff>
--- a/07-ohai_plugins.pptx
+++ b/07-ohai_plugins.pptx
@@ -174,13 +174,13 @@
   </p:defaultTextStyle>
   <p:extLst>
     <p:ext uri="{EFAFB233-063F-42B5-8137-9DF3F51BA10A}">
-      <p15:sldGuideLst xmlns:p15="http://schemas.microsoft.com/office/powerpoint/2012/main" xmlns="">
-        <p15:guide id="1" orient="horz" pos="1392" userDrawn="1">
+      <p15:sldGuideLst xmlns:p15="http://schemas.microsoft.com/office/powerpoint/2012/main">
+        <p15:guide id="1" orient="horz" pos="1056" userDrawn="1">
           <p15:clr>
             <a:srgbClr val="A4A3A4"/>
           </p15:clr>
         </p15:guide>
-        <p15:guide id="2" pos="5120" userDrawn="1">
+        <p15:guide id="2" pos="5144" userDrawn="1">
           <p15:clr>
             <a:srgbClr val="A4A3A4"/>
           </p15:clr>
@@ -188,7 +188,7 @@
       </p15:sldGuideLst>
     </p:ext>
     <p:ext uri="{2D200454-40CA-4A62-9FC3-DE9A4176ACB9}">
-      <p15:notesGuideLst xmlns:p15="http://schemas.microsoft.com/office/powerpoint/2012/main" xmlns=""/>
+      <p15:notesGuideLst xmlns:p15="http://schemas.microsoft.com/office/powerpoint/2012/main"/>
     </p:ext>
   </p:extLst>
 </p:presentation>
@@ -305,7 +305,7 @@
               <a:pPr>
                 <a:defRPr/>
               </a:pPr>
-              <a:t>10/21/16</a:t>
+              <a:t>2016-10-23</a:t>
             </a:fld>
             <a:endParaRPr lang="en-US" dirty="0"/>
           </a:p>
@@ -488,7 +488,7 @@
               <a:pPr>
                 <a:defRPr/>
               </a:pPr>
-              <a:t>10/21/16</a:t>
+              <a:t>2016-10-23</a:t>
             </a:fld>
             <a:endParaRPr lang="en-US" dirty="0"/>
           </a:p>
@@ -2252,11 +2252,7 @@
             </a:r>
             <a:r>
               <a:rPr lang="en-US" baseline="0" dirty="0" smtClean="0"/>
-              <a:t> is being used</a:t>
-            </a:r>
-            <a:r>
-              <a:rPr lang="en-US" baseline="0" dirty="0" smtClean="0"/>
-              <a:t>.</a:t>
+              <a:t> is being used.</a:t>
             </a:r>
           </a:p>
         </p:txBody>
@@ -2430,23 +2426,7 @@
             </a:r>
             <a:r>
               <a:rPr lang="en-US" baseline="0" dirty="0" smtClean="0"/>
-              <a:t> 8 continues to use </a:t>
-            </a:r>
-            <a:r>
-              <a:rPr lang="en-US" baseline="0" dirty="0" smtClean="0"/>
-              <a:t>that same </a:t>
-            </a:r>
-            <a:r>
-              <a:rPr lang="en-US" baseline="0" dirty="0" smtClean="0"/>
-              <a:t>language. The following slides and our exercise in the next module will focus on the </a:t>
-            </a:r>
-            <a:r>
-              <a:rPr lang="en-US" baseline="0" dirty="0" smtClean="0"/>
-              <a:t>DSL defined </a:t>
-            </a:r>
-            <a:r>
-              <a:rPr lang="en-US" baseline="0" dirty="0" smtClean="0"/>
-              <a:t>in </a:t>
+              <a:t> 8 continues to use that same language. The following slides and our exercise in the next module will focus on the DSL defined in </a:t>
             </a:r>
             <a:r>
               <a:rPr lang="en-US" baseline="0" dirty="0" err="1" smtClean="0"/>
@@ -3074,11 +3054,7 @@
           <a:p>
             <a:r>
               <a:rPr lang="en-US" baseline="0" dirty="0" smtClean="0"/>
-              <a:t>This plugin is named Languages. It provides the languages attribute on the node. This languages attribute is populated with the contents of a new Mash</a:t>
-            </a:r>
-            <a:r>
-              <a:rPr lang="en-US" baseline="0" dirty="0" smtClean="0"/>
-              <a:t>.</a:t>
+              <a:t>This plugin is named Languages. It provides the languages attribute on the node. This languages attribute is populated with the contents of a new Mash.</a:t>
             </a:r>
           </a:p>
           <a:p>
@@ -3089,7 +3065,6 @@
               <a:rPr lang="en-US" baseline="0" dirty="0" smtClean="0"/>
               <a:t>But what is a Mash?</a:t>
             </a:r>
-            <a:endParaRPr lang="en-US" baseline="0" dirty="0" smtClean="0"/>
           </a:p>
         </p:txBody>
       </p:sp>
@@ -5542,7 +5517,7 @@
   <p:clrMapOvr>
     <a:masterClrMapping/>
   </p:clrMapOvr>
-  <p:transition xmlns:p14="http://schemas.microsoft.com/office/powerpoint/2010/main" spd="med">
+  <p:transition spd="med">
     <p:fade/>
   </p:transition>
 </p:sldLayout>
@@ -5837,7 +5812,7 @@
   <p:clrMapOvr>
     <a:overrideClrMapping bg1="lt1" tx1="dk1" bg2="lt2" tx2="dk2" accent1="accent1" accent2="accent2" accent3="accent3" accent4="accent4" accent5="accent5" accent6="accent6" hlink="hlink" folHlink="folHlink"/>
   </p:clrMapOvr>
-  <p:transition xmlns:p14="http://schemas.microsoft.com/office/powerpoint/2010/main" spd="med">
+  <p:transition spd="med">
     <p:fade/>
   </p:transition>
 </p:sldLayout>
@@ -5970,14 +5945,14 @@
           </a:ln>
           <a:extLst>
             <a:ext uri="{909E8E84-426E-40dd-AFC4-6F175D3DCCD1}">
-              <a14:hiddenFill xmlns:a14="http://schemas.microsoft.com/office/drawing/2010/main">
+              <a14:hiddenFill xmlns:a14="http://schemas.microsoft.com/office/drawing/2010/main" xmlns="">
                 <a:solidFill>
                   <a:srgbClr val="FFFFFF"/>
                 </a:solidFill>
               </a14:hiddenFill>
             </a:ext>
             <a:ext uri="{91240B29-F687-4f45-9708-019B960494DF}">
-              <a14:hiddenLine xmlns:a14="http://schemas.microsoft.com/office/drawing/2010/main" w="9525">
+              <a14:hiddenLine xmlns:a14="http://schemas.microsoft.com/office/drawing/2010/main" xmlns="" w="9525">
                 <a:solidFill>
                   <a:srgbClr val="000000"/>
                 </a:solidFill>
@@ -6125,14 +6100,14 @@
           </a:ln>
           <a:extLst>
             <a:ext uri="{909E8E84-426E-40dd-AFC4-6F175D3DCCD1}">
-              <a14:hiddenFill xmlns:a14="http://schemas.microsoft.com/office/drawing/2010/main">
+              <a14:hiddenFill xmlns:a14="http://schemas.microsoft.com/office/drawing/2010/main" xmlns="">
                 <a:solidFill>
                   <a:srgbClr val="FFFFFF"/>
                 </a:solidFill>
               </a14:hiddenFill>
             </a:ext>
             <a:ext uri="{91240B29-F687-4f45-9708-019B960494DF}">
-              <a14:hiddenLine xmlns:a14="http://schemas.microsoft.com/office/drawing/2010/main" w="9525">
+              <a14:hiddenLine xmlns:a14="http://schemas.microsoft.com/office/drawing/2010/main" xmlns="" w="9525">
                 <a:solidFill>
                   <a:srgbClr val="000000"/>
                 </a:solidFill>
@@ -6530,7 +6505,7 @@
   <p:clrMapOvr>
     <a:overrideClrMapping bg1="lt1" tx1="dk1" bg2="lt2" tx2="dk2" accent1="accent1" accent2="accent2" accent3="accent3" accent4="accent4" accent5="accent5" accent6="accent6" hlink="hlink" folHlink="folHlink"/>
   </p:clrMapOvr>
-  <p:transition xmlns:p14="http://schemas.microsoft.com/office/powerpoint/2010/main" spd="med">
+  <p:transition spd="med">
     <p:fade/>
   </p:transition>
 </p:sldLayout>
@@ -6623,14 +6598,14 @@
           </a:ln>
           <a:extLst>
             <a:ext uri="{909E8E84-426E-40dd-AFC4-6F175D3DCCD1}">
-              <a14:hiddenFill xmlns:a14="http://schemas.microsoft.com/office/drawing/2010/main">
+              <a14:hiddenFill xmlns:a14="http://schemas.microsoft.com/office/drawing/2010/main" xmlns="">
                 <a:solidFill>
                   <a:srgbClr val="FFFFFF"/>
                 </a:solidFill>
               </a14:hiddenFill>
             </a:ext>
             <a:ext uri="{91240B29-F687-4f45-9708-019B960494DF}">
-              <a14:hiddenLine xmlns:a14="http://schemas.microsoft.com/office/drawing/2010/main" w="9525">
+              <a14:hiddenLine xmlns:a14="http://schemas.microsoft.com/office/drawing/2010/main" xmlns="" w="9525">
                 <a:solidFill>
                   <a:srgbClr val="000000"/>
                 </a:solidFill>
@@ -6652,7 +6627,7 @@
   <p:clrMapOvr>
     <a:masterClrMapping/>
   </p:clrMapOvr>
-  <p:transition xmlns:p14="http://schemas.microsoft.com/office/powerpoint/2010/main" spd="med">
+  <p:transition spd="med">
     <p:fade/>
   </p:transition>
 </p:sldLayout>
@@ -6939,7 +6914,7 @@
   <p:clrMapOvr>
     <a:masterClrMapping/>
   </p:clrMapOvr>
-  <p:transition xmlns:p14="http://schemas.microsoft.com/office/powerpoint/2010/main" spd="med">
+  <p:transition spd="med">
     <p:fade/>
   </p:transition>
 </p:sldLayout>
@@ -7156,14 +7131,14 @@
           </a:ln>
           <a:extLst>
             <a:ext uri="{909E8E84-426E-40dd-AFC4-6F175D3DCCD1}">
-              <a14:hiddenFill xmlns:a14="http://schemas.microsoft.com/office/drawing/2010/main">
+              <a14:hiddenFill xmlns:a14="http://schemas.microsoft.com/office/drawing/2010/main" xmlns="">
                 <a:solidFill>
                   <a:srgbClr val="FFFFFF"/>
                 </a:solidFill>
               </a14:hiddenFill>
             </a:ext>
             <a:ext uri="{91240B29-F687-4f45-9708-019B960494DF}">
-              <a14:hiddenLine xmlns:a14="http://schemas.microsoft.com/office/drawing/2010/main" w="9525">
+              <a14:hiddenLine xmlns:a14="http://schemas.microsoft.com/office/drawing/2010/main" xmlns="" w="9525">
                 <a:solidFill>
                   <a:srgbClr val="000000"/>
                 </a:solidFill>
@@ -7360,7 +7335,7 @@
   <p:clrMapOvr>
     <a:masterClrMapping/>
   </p:clrMapOvr>
-  <p:transition xmlns:p14="http://schemas.microsoft.com/office/powerpoint/2010/main" spd="med">
+  <p:transition spd="med">
     <p:fade/>
   </p:transition>
 </p:sldLayout>
@@ -7647,7 +7622,7 @@
   <p:clrMapOvr>
     <a:masterClrMapping/>
   </p:clrMapOvr>
-  <p:transition xmlns:p14="http://schemas.microsoft.com/office/powerpoint/2010/main" spd="med">
+  <p:transition spd="med">
     <p:fade/>
   </p:transition>
 </p:sldLayout>
@@ -7934,7 +7909,7 @@
   <p:clrMapOvr>
     <a:masterClrMapping/>
   </p:clrMapOvr>
-  <p:transition xmlns:p14="http://schemas.microsoft.com/office/powerpoint/2010/main" spd="med">
+  <p:transition spd="med">
     <p:fade/>
   </p:transition>
 </p:sldLayout>
@@ -8283,7 +8258,7 @@
   <p:clrMapOvr>
     <a:masterClrMapping/>
   </p:clrMapOvr>
-  <p:transition xmlns:p14="http://schemas.microsoft.com/office/powerpoint/2010/main" spd="med">
+  <p:transition spd="med">
     <p:fade/>
   </p:transition>
 </p:sldLayout>
@@ -8570,7 +8545,7 @@
   <p:clrMapOvr>
     <a:masterClrMapping/>
   </p:clrMapOvr>
-  <p:transition xmlns:p14="http://schemas.microsoft.com/office/powerpoint/2010/main" spd="med">
+  <p:transition spd="med">
     <p:fade/>
   </p:transition>
 </p:sldLayout>
@@ -8787,14 +8762,14 @@
           </a:ln>
           <a:extLst>
             <a:ext uri="{909E8E84-426E-40dd-AFC4-6F175D3DCCD1}">
-              <a14:hiddenFill xmlns:a14="http://schemas.microsoft.com/office/drawing/2010/main">
+              <a14:hiddenFill xmlns:a14="http://schemas.microsoft.com/office/drawing/2010/main" xmlns="">
                 <a:solidFill>
                   <a:srgbClr val="FFFFFF"/>
                 </a:solidFill>
               </a14:hiddenFill>
             </a:ext>
             <a:ext uri="{91240B29-F687-4f45-9708-019B960494DF}">
-              <a14:hiddenLine xmlns:a14="http://schemas.microsoft.com/office/drawing/2010/main" w="9525">
+              <a14:hiddenLine xmlns:a14="http://schemas.microsoft.com/office/drawing/2010/main" xmlns="" w="9525">
                 <a:solidFill>
                   <a:srgbClr val="000000"/>
                 </a:solidFill>
@@ -8991,7 +8966,7 @@
   <p:clrMapOvr>
     <a:masterClrMapping/>
   </p:clrMapOvr>
-  <p:transition xmlns:p14="http://schemas.microsoft.com/office/powerpoint/2010/main" spd="med">
+  <p:transition spd="med">
     <p:fade/>
   </p:transition>
 </p:sldLayout>
@@ -9168,7 +9143,7 @@
   <p:clrMapOvr>
     <a:masterClrMapping/>
   </p:clrMapOvr>
-  <p:transition xmlns:p14="http://schemas.microsoft.com/office/powerpoint/2010/main" spd="med">
+  <p:transition spd="med">
     <p:fade/>
   </p:transition>
 </p:sldLayout>
@@ -9456,7 +9431,7 @@
   <p:clrMapOvr>
     <a:masterClrMapping/>
   </p:clrMapOvr>
-  <p:transition xmlns:p14="http://schemas.microsoft.com/office/powerpoint/2010/main" spd="med">
+  <p:transition spd="med">
     <p:fade/>
   </p:transition>
 </p:sldLayout>
@@ -9768,7 +9743,7 @@
   <p:clrMapOvr>
     <a:masterClrMapping/>
   </p:clrMapOvr>
-  <p:transition xmlns:p14="http://schemas.microsoft.com/office/powerpoint/2010/main" spd="med">
+  <p:transition spd="med">
     <p:fade/>
   </p:transition>
 </p:sldLayout>
@@ -10072,7 +10047,7 @@
   <p:clrMapOvr>
     <a:masterClrMapping/>
   </p:clrMapOvr>
-  <p:transition xmlns:p14="http://schemas.microsoft.com/office/powerpoint/2010/main" spd="med">
+  <p:transition spd="med">
     <p:fade/>
   </p:transition>
 </p:sldLayout>
@@ -10148,14 +10123,14 @@
           </a:ln>
           <a:extLst>
             <a:ext uri="{909E8E84-426E-40dd-AFC4-6F175D3DCCD1}">
-              <a14:hiddenFill xmlns:a14="http://schemas.microsoft.com/office/drawing/2010/main">
+              <a14:hiddenFill xmlns:a14="http://schemas.microsoft.com/office/drawing/2010/main" xmlns="">
                 <a:solidFill>
                   <a:srgbClr val="FFFFFF"/>
                 </a:solidFill>
               </a14:hiddenFill>
             </a:ext>
             <a:ext uri="{91240B29-F687-4f45-9708-019B960494DF}">
-              <a14:hiddenLine xmlns:a14="http://schemas.microsoft.com/office/drawing/2010/main" w="9525">
+              <a14:hiddenLine xmlns:a14="http://schemas.microsoft.com/office/drawing/2010/main" xmlns="" w="9525">
                 <a:solidFill>
                   <a:srgbClr val="000000"/>
                 </a:solidFill>
@@ -10431,7 +10406,7 @@
   <p:clrMapOvr>
     <a:overrideClrMapping bg1="lt1" tx1="dk1" bg2="lt2" tx2="dk2" accent1="accent1" accent2="accent2" accent3="accent3" accent4="accent4" accent5="accent5" accent6="accent6" hlink="hlink" folHlink="folHlink"/>
   </p:clrMapOvr>
-  <p:transition xmlns:p14="http://schemas.microsoft.com/office/powerpoint/2010/main" spd="med">
+  <p:transition spd="med">
     <p:fade/>
   </p:transition>
 </p:sldLayout>
@@ -10637,7 +10612,7 @@
   <p:clrMapOvr>
     <a:overrideClrMapping bg1="lt1" tx1="dk1" bg2="lt2" tx2="dk2" accent1="accent1" accent2="accent2" accent3="accent3" accent4="accent4" accent5="accent5" accent6="accent6" hlink="hlink" folHlink="folHlink"/>
   </p:clrMapOvr>
-  <p:transition xmlns:p14="http://schemas.microsoft.com/office/powerpoint/2010/main" spd="med">
+  <p:transition spd="med">
     <p:fade/>
   </p:transition>
 </p:sldLayout>
@@ -10713,14 +10688,14 @@
           </a:ln>
           <a:extLst>
             <a:ext uri="{909E8E84-426E-40dd-AFC4-6F175D3DCCD1}">
-              <a14:hiddenFill xmlns:a14="http://schemas.microsoft.com/office/drawing/2010/main">
+              <a14:hiddenFill xmlns:a14="http://schemas.microsoft.com/office/drawing/2010/main" xmlns="">
                 <a:solidFill>
                   <a:srgbClr val="FFFFFF"/>
                 </a:solidFill>
               </a14:hiddenFill>
             </a:ext>
             <a:ext uri="{91240B29-F687-4f45-9708-019B960494DF}">
-              <a14:hiddenLine xmlns:a14="http://schemas.microsoft.com/office/drawing/2010/main" w="9525">
+              <a14:hiddenLine xmlns:a14="http://schemas.microsoft.com/office/drawing/2010/main" xmlns="" w="9525">
                 <a:solidFill>
                   <a:srgbClr val="000000"/>
                 </a:solidFill>
@@ -11003,7 +10978,7 @@
   <p:clrMapOvr>
     <a:overrideClrMapping bg1="lt1" tx1="dk1" bg2="lt2" tx2="dk2" accent1="accent1" accent2="accent2" accent3="accent3" accent4="accent4" accent5="accent5" accent6="accent6" hlink="hlink" folHlink="folHlink"/>
   </p:clrMapOvr>
-  <p:transition xmlns:p14="http://schemas.microsoft.com/office/powerpoint/2010/main" spd="med">
+  <p:transition spd="med">
     <p:fade/>
   </p:transition>
 </p:sldLayout>
@@ -11211,7 +11186,7 @@
   <p:clrMapOvr>
     <a:overrideClrMapping bg1="lt1" tx1="dk1" bg2="lt2" tx2="dk2" accent1="accent1" accent2="accent2" accent3="accent3" accent4="accent4" accent5="accent5" accent6="accent6" hlink="hlink" folHlink="folHlink"/>
   </p:clrMapOvr>
-  <p:transition xmlns:p14="http://schemas.microsoft.com/office/powerpoint/2010/main" spd="med">
+  <p:transition spd="med">
     <p:fade/>
   </p:transition>
 </p:sldLayout>
@@ -11287,14 +11262,14 @@
           </a:ln>
           <a:extLst>
             <a:ext uri="{909E8E84-426E-40dd-AFC4-6F175D3DCCD1}">
-              <a14:hiddenFill xmlns:a14="http://schemas.microsoft.com/office/drawing/2010/main">
+              <a14:hiddenFill xmlns:a14="http://schemas.microsoft.com/office/drawing/2010/main" xmlns="">
                 <a:solidFill>
                   <a:srgbClr val="FFFFFF"/>
                 </a:solidFill>
               </a14:hiddenFill>
             </a:ext>
             <a:ext uri="{91240B29-F687-4f45-9708-019B960494DF}">
-              <a14:hiddenLine xmlns:a14="http://schemas.microsoft.com/office/drawing/2010/main" w="9525">
+              <a14:hiddenLine xmlns:a14="http://schemas.microsoft.com/office/drawing/2010/main" xmlns="" w="9525">
                 <a:solidFill>
                   <a:srgbClr val="000000"/>
                 </a:solidFill>
@@ -11562,7 +11537,7 @@
   <p:clrMapOvr>
     <a:overrideClrMapping bg1="lt1" tx1="dk1" bg2="lt2" tx2="dk2" accent1="accent1" accent2="accent2" accent3="accent3" accent4="accent4" accent5="accent5" accent6="accent6" hlink="hlink" folHlink="folHlink"/>
   </p:clrMapOvr>
-  <p:transition xmlns:p14="http://schemas.microsoft.com/office/powerpoint/2010/main" spd="med">
+  <p:transition spd="med">
     <p:fade/>
   </p:transition>
 </p:sldLayout>
@@ -11790,7 +11765,7 @@
   <p:clrMapOvr>
     <a:overrideClrMapping bg1="lt1" tx1="dk1" bg2="lt2" tx2="dk2" accent1="accent1" accent2="accent2" accent3="accent3" accent4="accent4" accent5="accent5" accent6="accent6" hlink="hlink" folHlink="folHlink"/>
   </p:clrMapOvr>
-  <p:transition xmlns:p14="http://schemas.microsoft.com/office/powerpoint/2010/main" spd="med">
+  <p:transition spd="med">
     <p:fade/>
   </p:transition>
 </p:sldLayout>
@@ -12078,7 +12053,7 @@
   <p:clrMapOvr>
     <a:overrideClrMapping bg1="lt1" tx1="dk1" bg2="lt2" tx2="dk2" accent1="accent1" accent2="accent2" accent3="accent3" accent4="accent4" accent5="accent5" accent6="accent6" hlink="hlink" folHlink="folHlink"/>
   </p:clrMapOvr>
-  <p:transition xmlns:p14="http://schemas.microsoft.com/office/powerpoint/2010/main" spd="med">
+  <p:transition spd="med">
     <p:fade/>
   </p:transition>
 </p:sldLayout>
@@ -12234,14 +12209,14 @@
           </a:ln>
           <a:extLst>
             <a:ext uri="{909E8E84-426E-40dd-AFC4-6F175D3DCCD1}">
-              <a14:hiddenFill xmlns:a14="http://schemas.microsoft.com/office/drawing/2010/main">
+              <a14:hiddenFill xmlns:a14="http://schemas.microsoft.com/office/drawing/2010/main" xmlns="">
                 <a:solidFill>
                   <a:srgbClr val="FFFFFF"/>
                 </a:solidFill>
               </a14:hiddenFill>
             </a:ext>
             <a:ext uri="{91240B29-F687-4f45-9708-019B960494DF}">
-              <a14:hiddenLine xmlns:a14="http://schemas.microsoft.com/office/drawing/2010/main" w="9525">
+              <a14:hiddenLine xmlns:a14="http://schemas.microsoft.com/office/drawing/2010/main" xmlns="" w="9525">
                 <a:solidFill>
                   <a:srgbClr val="000000"/>
                 </a:solidFill>
@@ -12504,13 +12479,13 @@
     <p:sldLayoutId id="2147483867" r:id="rId13"/>
     <p:sldLayoutId id="2147483869" r:id="rId14"/>
   </p:sldLayoutIdLst>
-  <p:transition xmlns:p14="http://schemas.microsoft.com/office/powerpoint/2010/main" spd="med">
+  <p:transition spd="med">
     <p:fade/>
   </p:transition>
   <p:timing>
     <p:tnLst>
       <p:par>
-        <p:cTn xmlns:p14="http://schemas.microsoft.com/office/powerpoint/2010/main" id="1" dur="indefinite" restart="never" nodeType="tmRoot"/>
+        <p:cTn id="1" dur="indefinite" restart="never" nodeType="tmRoot"/>
       </p:par>
     </p:tnLst>
   </p:timing>
@@ -13038,14 +13013,14 @@
           </a:ln>
           <a:extLst>
             <a:ext uri="{909E8E84-426E-40dd-AFC4-6F175D3DCCD1}">
-              <a14:hiddenFill xmlns:a14="http://schemas.microsoft.com/office/drawing/2010/main">
+              <a14:hiddenFill xmlns:a14="http://schemas.microsoft.com/office/drawing/2010/main" xmlns="">
                 <a:solidFill>
                   <a:srgbClr val="FFFFFF"/>
                 </a:solidFill>
               </a14:hiddenFill>
             </a:ext>
             <a:ext uri="{91240B29-F687-4f45-9708-019B960494DF}">
-              <a14:hiddenLine xmlns:a14="http://schemas.microsoft.com/office/drawing/2010/main" w="9525">
+              <a14:hiddenLine xmlns:a14="http://schemas.microsoft.com/office/drawing/2010/main" xmlns="" w="9525">
                 <a:solidFill>
                   <a:srgbClr val="000000"/>
                 </a:solidFill>
@@ -13355,13 +13330,13 @@
     <p:sldLayoutId id="2147483856" r:id="rId7"/>
     <p:sldLayoutId id="2147483866" r:id="rId8"/>
   </p:sldLayoutIdLst>
-  <p:transition xmlns:p14="http://schemas.microsoft.com/office/powerpoint/2010/main" spd="med">
+  <p:transition spd="med">
     <p:fade/>
   </p:transition>
   <p:timing>
     <p:tnLst>
       <p:par>
-        <p:cTn xmlns:p14="http://schemas.microsoft.com/office/powerpoint/2010/main" id="1" dur="indefinite" restart="never" nodeType="tmRoot"/>
+        <p:cTn id="1" dur="indefinite" restart="never" nodeType="tmRoot"/>
       </p:par>
     </p:tnLst>
   </p:timing>
@@ -13859,13 +13834,13 @@
   <p:clrMapOvr>
     <a:masterClrMapping/>
   </p:clrMapOvr>
-  <p:transition xmlns:p14="http://schemas.microsoft.com/office/powerpoint/2010/main" spd="med">
+  <p:transition spd="med">
     <p:fade/>
   </p:transition>
   <p:timing>
     <p:tnLst>
       <p:par>
-        <p:cTn xmlns:p14="http://schemas.microsoft.com/office/powerpoint/2010/main" id="1" dur="indefinite" restart="never" nodeType="tmRoot"/>
+        <p:cTn id="1" dur="indefinite" restart="never" nodeType="tmRoot"/>
       </p:par>
     </p:tnLst>
   </p:timing>
@@ -13968,7 +13943,6 @@
               <a:rPr lang="en-US" sz="2400" dirty="0"/>
               <a:t>Checking connectivity... done.</a:t>
             </a:r>
-            <a:endParaRPr lang="en-US" sz="2400" dirty="0"/>
           </a:p>
         </p:txBody>
       </p:sp>
@@ -14052,7 +14026,7 @@
   <p:clrMapOvr>
     <a:masterClrMapping/>
   </p:clrMapOvr>
-  <p:transition xmlns:p14="http://schemas.microsoft.com/office/powerpoint/2010/main" spd="med">
+  <p:transition spd="med">
     <p:fade/>
   </p:transition>
 </p:sld>
@@ -14263,7 +14237,7 @@
   <p:clrMapOvr>
     <a:masterClrMapping/>
   </p:clrMapOvr>
-  <p:transition xmlns:p14="http://schemas.microsoft.com/office/powerpoint/2010/main" spd="med">
+  <p:transition spd="med">
     <p:fade/>
   </p:transition>
 </p:sld>
@@ -14523,7 +14497,7 @@
   <p:clrMapOvr>
     <a:masterClrMapping/>
   </p:clrMapOvr>
-  <p:transition xmlns:p14="http://schemas.microsoft.com/office/powerpoint/2010/main" spd="med">
+  <p:transition spd="med">
     <p:fade/>
   </p:transition>
 </p:sld>
@@ -14866,7 +14840,6 @@
               <a:rPr lang="en-US" dirty="0"/>
               <a:t>", "~&gt; 2.6.4"</a:t>
             </a:r>
-            <a:endParaRPr lang="en-US" dirty="0"/>
           </a:p>
         </p:txBody>
       </p:sp>
@@ -14915,7 +14888,7 @@
   <p:clrMapOvr>
     <a:masterClrMapping/>
   </p:clrMapOvr>
-  <p:transition xmlns:p14="http://schemas.microsoft.com/office/powerpoint/2010/main" spd="med">
+  <p:transition spd="med">
     <p:fade/>
   </p:transition>
 </p:sld>
@@ -15160,7 +15133,7 @@
   <p:clrMapOvr>
     <a:masterClrMapping/>
   </p:clrMapOvr>
-  <p:transition xmlns:p14="http://schemas.microsoft.com/office/powerpoint/2010/main" spd="med">
+  <p:transition spd="med">
     <p:fade/>
   </p:transition>
 </p:sld>
@@ -15358,7 +15331,6 @@
               <a:rPr lang="en-US" dirty="0"/>
               <a:t>/exception"</a:t>
             </a:r>
-            <a:endParaRPr lang="en-US" dirty="0"/>
           </a:p>
         </p:txBody>
       </p:sp>
@@ -15407,7 +15379,7 @@
   <p:clrMapOvr>
     <a:masterClrMapping/>
   </p:clrMapOvr>
-  <p:transition xmlns:p14="http://schemas.microsoft.com/office/powerpoint/2010/main" spd="med">
+  <p:transition spd="med">
     <p:fade/>
   </p:transition>
 </p:sld>
@@ -15678,7 +15650,7 @@
   <p:clrMapOvr>
     <a:masterClrMapping/>
   </p:clrMapOvr>
-  <p:transition xmlns:p14="http://schemas.microsoft.com/office/powerpoint/2010/main" spd="med">
+  <p:transition spd="med">
     <p:fade/>
   </p:transition>
 </p:sld>
@@ -15825,13 +15797,13 @@
   <p:clrMapOvr>
     <a:masterClrMapping/>
   </p:clrMapOvr>
-  <p:transition xmlns:p14="http://schemas.microsoft.com/office/powerpoint/2010/main" spd="med">
+  <p:transition spd="med">
     <p:fade/>
   </p:transition>
   <p:timing>
     <p:tnLst>
       <p:par>
-        <p:cTn xmlns:p14="http://schemas.microsoft.com/office/powerpoint/2010/main" id="1" dur="indefinite" restart="never" nodeType="tmRoot"/>
+        <p:cTn id="1" dur="indefinite" restart="never" nodeType="tmRoot"/>
       </p:par>
     </p:tnLst>
   </p:timing>
@@ -16049,19 +16021,6 @@
               </a:rPr>
               <a:t> 7</a:t>
             </a:r>
-            <a:endParaRPr lang="en-US" sz="8000" dirty="0" smtClean="0">
-              <a:gradFill>
-                <a:gsLst>
-                  <a:gs pos="0">
-                    <a:srgbClr val="FFFFFF"/>
-                  </a:gs>
-                  <a:gs pos="100000">
-                    <a:srgbClr val="FFFFFF"/>
-                  </a:gs>
-                </a:gsLst>
-                <a:lin ang="5400000" scaled="0"/>
-              </a:gradFill>
-            </a:endParaRPr>
           </a:p>
         </p:txBody>
       </p:sp>
@@ -16125,7 +16084,6 @@
               <a:rPr lang="en-US" sz="2000" b="1" dirty="0" smtClean="0"/>
               <a:t>6</a:t>
             </a:r>
-            <a:endParaRPr lang="en-US" sz="2000" b="1" dirty="0" smtClean="0"/>
           </a:p>
         </p:txBody>
       </p:sp>
@@ -16189,7 +16147,6 @@
               <a:rPr lang="en-US" sz="2000" b="1" dirty="0" smtClean="0"/>
               <a:t>7</a:t>
             </a:r>
-            <a:endParaRPr lang="en-US" sz="2000" b="1" dirty="0" smtClean="0"/>
           </a:p>
         </p:txBody>
       </p:sp>
@@ -16272,19 +16229,6 @@
               </a:rPr>
               <a:t> 8</a:t>
             </a:r>
-            <a:endParaRPr lang="en-US" sz="8000" dirty="0" smtClean="0">
-              <a:gradFill>
-                <a:gsLst>
-                  <a:gs pos="0">
-                    <a:srgbClr val="FFFFFF"/>
-                  </a:gs>
-                  <a:gs pos="100000">
-                    <a:srgbClr val="FFFFFF"/>
-                  </a:gs>
-                </a:gsLst>
-                <a:lin ang="5400000" scaled="0"/>
-              </a:gradFill>
-            </a:endParaRPr>
           </a:p>
         </p:txBody>
       </p:sp>
@@ -16356,7 +16300,6 @@
               <a:rPr lang="en-US" sz="2000" b="1" dirty="0" smtClean="0"/>
               <a:t>-8</a:t>
             </a:r>
-            <a:endParaRPr lang="en-US" sz="2000" b="1" dirty="0" smtClean="0"/>
           </a:p>
         </p:txBody>
       </p:sp>
@@ -16370,13 +16313,13 @@
   <p:clrMapOvr>
     <a:masterClrMapping/>
   </p:clrMapOvr>
-  <p:transition xmlns:p14="http://schemas.microsoft.com/office/powerpoint/2010/main" spd="med">
+  <p:transition spd="med">
     <p:fade/>
   </p:transition>
   <p:timing>
     <p:tnLst>
       <p:par>
-        <p:cTn xmlns:p14="http://schemas.microsoft.com/office/powerpoint/2010/main" id="1" dur="indefinite" restart="never" nodeType="tmRoot"/>
+        <p:cTn id="1" dur="indefinite" restart="never" nodeType="tmRoot"/>
       </p:par>
     </p:tnLst>
   </p:timing>
@@ -16481,19 +16424,6 @@
               </a:rPr>
               <a:t> 7</a:t>
             </a:r>
-            <a:endParaRPr lang="en-US" sz="8000" dirty="0" smtClean="0">
-              <a:gradFill>
-                <a:gsLst>
-                  <a:gs pos="0">
-                    <a:srgbClr val="FFFFFF"/>
-                  </a:gs>
-                  <a:gs pos="100000">
-                    <a:srgbClr val="FFFFFF"/>
-                  </a:gs>
-                </a:gsLst>
-                <a:lin ang="5400000" scaled="0"/>
-              </a:gradFill>
-            </a:endParaRPr>
           </a:p>
         </p:txBody>
       </p:sp>
@@ -16662,19 +16592,6 @@
               </a:rPr>
               <a:t> 8</a:t>
             </a:r>
-            <a:endParaRPr lang="en-US" sz="8000" dirty="0" smtClean="0">
-              <a:gradFill>
-                <a:gsLst>
-                  <a:gs pos="0">
-                    <a:srgbClr val="FFFFFF"/>
-                  </a:gs>
-                  <a:gs pos="100000">
-                    <a:srgbClr val="FFFFFF"/>
-                  </a:gs>
-                </a:gsLst>
-                <a:lin ang="5400000" scaled="0"/>
-              </a:gradFill>
-            </a:endParaRPr>
           </a:p>
         </p:txBody>
       </p:sp>
@@ -16768,13 +16685,13 @@
   <p:clrMapOvr>
     <a:masterClrMapping/>
   </p:clrMapOvr>
-  <p:transition xmlns:p14="http://schemas.microsoft.com/office/powerpoint/2010/main" spd="med">
+  <p:transition spd="med">
     <p:fade/>
   </p:transition>
   <p:timing>
     <p:tnLst>
       <p:par>
-        <p:cTn xmlns:p14="http://schemas.microsoft.com/office/powerpoint/2010/main" id="1" dur="indefinite" restart="never" nodeType="tmRoot"/>
+        <p:cTn id="1" dur="indefinite" restart="never" nodeType="tmRoot"/>
       </p:par>
     </p:tnLst>
   </p:timing>
@@ -17594,7 +17511,7 @@
   <p:clrMapOvr>
     <a:masterClrMapping/>
   </p:clrMapOvr>
-  <p:transition xmlns:p14="http://schemas.microsoft.com/office/powerpoint/2010/main" spd="med">
+  <p:transition spd="med">
     <p:fade/>
   </p:transition>
 </p:sld>
@@ -17634,15 +17551,7 @@
           <a:p>
             <a:r>
               <a:rPr lang="en-US" dirty="0" smtClean="0"/>
-              <a:t>Viewing the </a:t>
-            </a:r>
-            <a:r>
-              <a:rPr lang="en-US" dirty="0" smtClean="0"/>
-              <a:t>Languages </a:t>
-            </a:r>
-            <a:r>
-              <a:rPr lang="en-US" dirty="0" smtClean="0"/>
-              <a:t>Plugin</a:t>
+              <a:t>Viewing the Languages Plugin</a:t>
             </a:r>
             <a:endParaRPr lang="en-US" dirty="0"/>
           </a:p>
@@ -17773,13 +17682,13 @@
   <p:clrMapOvr>
     <a:masterClrMapping/>
   </p:clrMapOvr>
-  <p:transition xmlns:p14="http://schemas.microsoft.com/office/powerpoint/2010/main" spd="med">
+  <p:transition spd="med">
     <p:fade/>
   </p:transition>
   <p:timing>
     <p:tnLst>
       <p:par>
-        <p:cTn xmlns:p14="http://schemas.microsoft.com/office/powerpoint/2010/main" id="1" dur="indefinite" restart="never" nodeType="tmRoot"/>
+        <p:cTn id="1" dur="indefinite" restart="never" nodeType="tmRoot"/>
       </p:par>
     </p:tnLst>
   </p:timing>
@@ -17805,37 +17714,6 @@
       </p:grpSpPr>
       <p:sp>
         <p:nvSpPr>
-          <p:cNvPr id="2" name="Title 1"/>
-          <p:cNvSpPr>
-            <a:spLocks noGrp="1"/>
-          </p:cNvSpPr>
-          <p:nvPr>
-            <p:ph type="title"/>
-          </p:nvPr>
-        </p:nvSpPr>
-        <p:spPr/>
-        <p:txBody>
-          <a:bodyPr/>
-          <a:lstStyle/>
-          <a:p>
-            <a:r>
-              <a:rPr lang="en-US" dirty="0" smtClean="0"/>
-              <a:t>Viewing the </a:t>
-            </a:r>
-            <a:r>
-              <a:rPr lang="en-US" dirty="0" smtClean="0"/>
-              <a:t>Languages </a:t>
-            </a:r>
-            <a:r>
-              <a:rPr lang="en-US" dirty="0" smtClean="0"/>
-              <a:t>Plugin</a:t>
-            </a:r>
-            <a:endParaRPr lang="en-US" dirty="0"/>
-          </a:p>
-        </p:txBody>
-      </p:sp>
-      <p:sp>
-        <p:nvSpPr>
           <p:cNvPr id="3" name="Content Placeholder 2"/>
           <p:cNvSpPr>
             <a:spLocks noGrp="1"/>
@@ -17921,6 +17799,72 @@
               <a:t>end</a:t>
             </a:r>
             <a:endParaRPr lang="en-US" b="1" dirty="0"/>
+          </a:p>
+        </p:txBody>
+      </p:sp>
+      <p:sp>
+        <p:nvSpPr>
+          <p:cNvPr id="21" name="Right Bracket 20"/>
+          <p:cNvSpPr/>
+          <p:nvPr/>
+        </p:nvSpPr>
+        <p:spPr>
+          <a:xfrm>
+            <a:off x="5486402" y="3226456"/>
+            <a:ext cx="593558" cy="1510279"/>
+          </a:xfrm>
+          <a:prstGeom prst="rightBracket">
+            <a:avLst/>
+          </a:prstGeom>
+          <a:ln w="63500">
+            <a:solidFill>
+              <a:schemeClr val="accent1"/>
+            </a:solidFill>
+          </a:ln>
+        </p:spPr>
+        <p:style>
+          <a:lnRef idx="3">
+            <a:schemeClr val="accent1"/>
+          </a:lnRef>
+          <a:fillRef idx="0">
+            <a:schemeClr val="accent1"/>
+          </a:fillRef>
+          <a:effectRef idx="2">
+            <a:schemeClr val="accent1"/>
+          </a:effectRef>
+          <a:fontRef idx="minor">
+            <a:schemeClr val="tx1"/>
+          </a:fontRef>
+        </p:style>
+        <p:txBody>
+          <a:bodyPr rtlCol="0" anchor="ctr"/>
+          <a:lstStyle/>
+          <a:p>
+            <a:pPr algn="ctr"/>
+            <a:endParaRPr lang="en-US"/>
+          </a:p>
+        </p:txBody>
+      </p:sp>
+      <p:sp>
+        <p:nvSpPr>
+          <p:cNvPr id="2" name="Title 1"/>
+          <p:cNvSpPr>
+            <a:spLocks noGrp="1"/>
+          </p:cNvSpPr>
+          <p:nvPr>
+            <p:ph type="title"/>
+          </p:nvPr>
+        </p:nvSpPr>
+        <p:spPr/>
+        <p:txBody>
+          <a:bodyPr/>
+          <a:lstStyle/>
+          <a:p>
+            <a:r>
+              <a:rPr lang="en-US" dirty="0" smtClean="0"/>
+              <a:t>Viewing the Languages Plugin</a:t>
+            </a:r>
+            <a:endParaRPr lang="en-US" dirty="0"/>
           </a:p>
         </p:txBody>
       </p:sp>
@@ -18147,13 +18091,8 @@
           <a:p>
             <a:r>
               <a:rPr lang="en-US" b="1" dirty="0" smtClean="0"/>
-              <a:t>Code executed on all platforms and stored </a:t>
-            </a:r>
-            <a:r>
-              <a:rPr lang="en-US" b="1" dirty="0" smtClean="0"/>
-              <a:t>in the provided attribute(s).</a:t>
-            </a:r>
-            <a:endParaRPr lang="en-US" b="1" dirty="0" smtClean="0"/>
+              <a:t>Code executed on all platforms and stored in the provided attribute(s).</a:t>
+            </a:r>
           </a:p>
         </p:txBody>
       </p:sp>
@@ -18167,16 +18106,17 @@
         </p:nvCxnSpPr>
         <p:spPr>
           <a:xfrm flipH="1" flipV="1">
-            <a:off x="6397625" y="2905125"/>
-            <a:ext cx="2746375" cy="1544638"/>
+            <a:off x="6079959" y="2884612"/>
+            <a:ext cx="3064041" cy="1565151"/>
           </a:xfrm>
           <a:prstGeom prst="line">
             <a:avLst/>
           </a:prstGeom>
-          <a:ln>
+          <a:ln w="63500">
             <a:solidFill>
               <a:schemeClr val="accent5"/>
             </a:solidFill>
+            <a:tailEnd type="oval" w="lg" len="lg"/>
           </a:ln>
         </p:spPr>
         <p:style>
@@ -18199,21 +18139,23 @@
           <p:cNvPr id="13" name="Straight Connector 12"/>
           <p:cNvCxnSpPr>
             <a:stCxn id="9" idx="1"/>
+            <a:endCxn id="21" idx="2"/>
           </p:cNvCxnSpPr>
           <p:nvPr/>
         </p:nvCxnSpPr>
         <p:spPr>
           <a:xfrm flipH="1" flipV="1">
-            <a:off x="6318250" y="4079875"/>
-            <a:ext cx="2825750" cy="1612900"/>
+            <a:off x="6079960" y="3981596"/>
+            <a:ext cx="3064040" cy="1711179"/>
           </a:xfrm>
           <a:prstGeom prst="line">
             <a:avLst/>
           </a:prstGeom>
-          <a:ln>
+          <a:ln w="63500">
             <a:solidFill>
               <a:schemeClr val="accent1"/>
             </a:solidFill>
+            <a:tailEnd type="oval" w="lg" len="lg"/>
           </a:ln>
         </p:spPr>
         <p:style>
@@ -18241,16 +18183,17 @@
         </p:nvCxnSpPr>
         <p:spPr>
           <a:xfrm flipH="1" flipV="1">
-            <a:off x="5978525" y="2438401"/>
-            <a:ext cx="3165474" cy="577849"/>
+            <a:off x="6079959" y="2401054"/>
+            <a:ext cx="3064040" cy="615196"/>
           </a:xfrm>
           <a:prstGeom prst="line">
             <a:avLst/>
           </a:prstGeom>
-          <a:ln>
+          <a:ln w="63500">
             <a:solidFill>
               <a:schemeClr val="accent4"/>
             </a:solidFill>
+            <a:tailEnd type="oval" w="lg" len="lg"/>
           </a:ln>
         </p:spPr>
         <p:style>
@@ -18278,9 +18221,16 @@
   <p:clrMapOvr>
     <a:masterClrMapping/>
   </p:clrMapOvr>
-  <p:transition xmlns:p14="http://schemas.microsoft.com/office/powerpoint/2010/main" spd="med">
+  <p:transition spd="med">
     <p:fade/>
   </p:transition>
+  <p:timing>
+    <p:tnLst>
+      <p:par>
+        <p:cTn id="1" dur="indefinite" restart="never" nodeType="tmRoot"/>
+      </p:par>
+    </p:tnLst>
+  </p:timing>
 </p:sld>
 </file>
 
@@ -18527,7 +18477,6 @@
               <a:rPr lang="en-US" dirty="0" smtClean="0"/>
               <a:t>.</a:t>
             </a:r>
-            <a:endParaRPr lang="en-US" dirty="0" smtClean="0"/>
           </a:p>
         </p:txBody>
       </p:sp>
@@ -18541,9 +18490,16 @@
   <p:clrMapOvr>
     <a:masterClrMapping/>
   </p:clrMapOvr>
-  <p:transition xmlns:p14="http://schemas.microsoft.com/office/powerpoint/2010/main" spd="med">
+  <p:transition spd="med">
     <p:fade/>
   </p:transition>
+  <p:timing>
+    <p:tnLst>
+      <p:par>
+        <p:cTn id="1" dur="indefinite" restart="never" nodeType="tmRoot"/>
+      </p:par>
+    </p:tnLst>
+  </p:timing>
 </p:sld>
 </file>
 
@@ -18723,13 +18679,6 @@
               </a:rPr>
               <a:t>=&gt; nil</a:t>
             </a:r>
-            <a:endParaRPr lang="en-US" sz="2400" b="1" dirty="0">
-              <a:solidFill>
-                <a:schemeClr val="bg1"/>
-              </a:solidFill>
-              <a:latin typeface="Courier New"/>
-              <a:cs typeface="Courier New"/>
-            </a:endParaRPr>
           </a:p>
         </p:txBody>
       </p:sp>
@@ -18767,7 +18716,6 @@
               <a:rPr lang="en-US" b="1" dirty="0" smtClean="0"/>
               <a:t>ey</a:t>
             </a:r>
-            <a:endParaRPr lang="en-US" b="1" dirty="0" smtClean="0"/>
           </a:p>
         </p:txBody>
       </p:sp>
@@ -19105,7 +19053,6 @@
               <a:rPr lang="en-US" b="1" dirty="0" smtClean="0"/>
               <a:t>ey</a:t>
             </a:r>
-            <a:endParaRPr lang="en-US" b="1" dirty="0" smtClean="0"/>
           </a:p>
         </p:txBody>
       </p:sp>
@@ -19119,7 +19066,7 @@
   <p:clrMapOvr>
     <a:masterClrMapping/>
   </p:clrMapOvr>
-  <p:transition xmlns:p14="http://schemas.microsoft.com/office/powerpoint/2010/main" spd="med">
+  <p:transition spd="med">
     <p:fade/>
   </p:transition>
 </p:sld>
@@ -19419,7 +19366,6 @@
               <a:rPr lang="en-US" b="1" dirty="0" smtClean="0"/>
               <a:t>ey</a:t>
             </a:r>
-            <a:endParaRPr lang="en-US" b="1" dirty="0" smtClean="0"/>
           </a:p>
         </p:txBody>
       </p:sp>
@@ -19865,13 +19811,6 @@
               </a:rPr>
               <a:t>=&gt; "Chef"</a:t>
             </a:r>
-            <a:endParaRPr lang="en-US" sz="2000" b="1" dirty="0">
-              <a:solidFill>
-                <a:schemeClr val="bg1"/>
-              </a:solidFill>
-              <a:latin typeface="Courier New"/>
-              <a:cs typeface="Courier New"/>
-            </a:endParaRPr>
           </a:p>
         </p:txBody>
       </p:sp>
@@ -19909,7 +19848,6 @@
               <a:rPr lang="en-US" b="1" dirty="0" smtClean="0"/>
               <a:t>ey</a:t>
             </a:r>
-            <a:endParaRPr lang="en-US" b="1" dirty="0" smtClean="0"/>
           </a:p>
         </p:txBody>
       </p:sp>
@@ -19923,7 +19861,7 @@
   <p:clrMapOvr>
     <a:masterClrMapping/>
   </p:clrMapOvr>
-  <p:transition xmlns:p14="http://schemas.microsoft.com/office/powerpoint/2010/main" spd="med">
+  <p:transition spd="med">
     <p:fade/>
   </p:transition>
 </p:sld>
@@ -20070,7 +20008,7 @@
   <p:clrMapOvr>
     <a:masterClrMapping/>
   </p:clrMapOvr>
-  <p:transition xmlns:p14="http://schemas.microsoft.com/office/powerpoint/2010/main" spd="med">
+  <p:transition spd="med">
     <p:fade/>
   </p:transition>
 </p:sld>
@@ -20275,7 +20213,6 @@
               <a:rPr lang="en-US" dirty="0"/>
               <a:t> &gt;= 6</a:t>
             </a:r>
-            <a:endParaRPr lang="en-US" dirty="0"/>
           </a:p>
         </p:txBody>
       </p:sp>
@@ -20429,7 +20366,6 @@
               <a:rPr lang="en-US" b="1" dirty="0" smtClean="0"/>
               <a:t>This plugin depends on the attributes in the Languages to be defined</a:t>
             </a:r>
-            <a:endParaRPr lang="en-US" b="1" dirty="0" smtClean="0"/>
           </a:p>
         </p:txBody>
       </p:sp>
@@ -20443,16 +20379,17 @@
         </p:nvCxnSpPr>
         <p:spPr>
           <a:xfrm flipH="1" flipV="1">
-            <a:off x="6111876" y="2714625"/>
-            <a:ext cx="3032124" cy="84138"/>
+            <a:off x="6368716" y="2646947"/>
+            <a:ext cx="2775284" cy="151816"/>
           </a:xfrm>
           <a:prstGeom prst="line">
             <a:avLst/>
           </a:prstGeom>
-          <a:ln>
+          <a:ln w="63500">
             <a:solidFill>
               <a:schemeClr val="accent5"/>
             </a:solidFill>
+            <a:tailEnd type="oval" w="lg" len="lg"/>
           </a:ln>
         </p:spPr>
         <p:style>
@@ -20480,16 +20417,17 @@
         </p:nvCxnSpPr>
         <p:spPr>
           <a:xfrm flipH="1" flipV="1">
-            <a:off x="4921250" y="3460750"/>
-            <a:ext cx="4222750" cy="549275"/>
+            <a:off x="4924926" y="3383381"/>
+            <a:ext cx="4219074" cy="626644"/>
           </a:xfrm>
           <a:prstGeom prst="line">
             <a:avLst/>
           </a:prstGeom>
-          <a:ln>
+          <a:ln w="63500">
             <a:solidFill>
               <a:srgbClr val="660066"/>
             </a:solidFill>
+            <a:tailEnd type="oval" w="lg" len="lg"/>
           </a:ln>
         </p:spPr>
         <p:style>
@@ -20517,7 +20455,7 @@
   <p:clrMapOvr>
     <a:masterClrMapping/>
   </p:clrMapOvr>
-  <p:transition xmlns:p14="http://schemas.microsoft.com/office/powerpoint/2010/main" spd="med">
+  <p:transition spd="med">
     <p:fade/>
   </p:transition>
 </p:sld>
@@ -20722,7 +20660,6 @@
               <a:rPr lang="en-US" dirty="0"/>
               <a:t> &gt;= 6</a:t>
             </a:r>
-            <a:endParaRPr lang="en-US" dirty="0"/>
           </a:p>
         </p:txBody>
       </p:sp>
@@ -20844,7 +20781,7 @@
   <p:clrMapOvr>
     <a:masterClrMapping/>
   </p:clrMapOvr>
-  <p:transition xmlns:p14="http://schemas.microsoft.com/office/powerpoint/2010/main" spd="med">
+  <p:transition spd="med">
     <p:fade/>
   </p:transition>
 </p:sld>
@@ -20945,7 +20882,7 @@
   <p:clrMapOvr>
     <a:masterClrMapping/>
   </p:clrMapOvr>
-  <p:transition xmlns:p14="http://schemas.microsoft.com/office/powerpoint/2010/main" spd="med">
+  <p:transition spd="med">
     <p:fade/>
   </p:transition>
 </p:sld>
@@ -21096,7 +21033,7 @@
   <p:clrMapOvr>
     <a:masterClrMapping/>
   </p:clrMapOvr>
-  <p:transition xmlns:p14="http://schemas.microsoft.com/office/powerpoint/2010/main" spd="med">
+  <p:transition spd="med">
     <p:fade/>
   </p:transition>
 </p:sld>
@@ -21190,11 +21127,7 @@
             </a:pPr>
             <a:r>
               <a:rPr lang="en-US" dirty="0" smtClean="0"/>
-              <a:t>Express what a plugin provides, depends on, and how it collects its </a:t>
-            </a:r>
-            <a:r>
-              <a:rPr lang="en-US" dirty="0" smtClean="0"/>
-              <a:t>data</a:t>
+              <a:t>Express what a plugin provides, depends on, and how it collects its data</a:t>
             </a:r>
             <a:endParaRPr lang="en-US" dirty="0"/>
           </a:p>
@@ -21210,13 +21143,13 @@
   <p:clrMapOvr>
     <a:masterClrMapping/>
   </p:clrMapOvr>
-  <p:transition xmlns:p14="http://schemas.microsoft.com/office/powerpoint/2010/main" spd="med">
+  <p:transition spd="med">
     <p:fade/>
   </p:transition>
   <p:timing>
     <p:tnLst>
       <p:par>
-        <p:cTn xmlns:p14="http://schemas.microsoft.com/office/powerpoint/2010/main" id="1" dur="indefinite" restart="never" nodeType="tmRoot"/>
+        <p:cTn id="1" dur="indefinite" restart="never" nodeType="tmRoot"/>
       </p:par>
     </p:tnLst>
   </p:timing>
@@ -21325,7 +21258,7 @@
   <p:clrMapOvr>
     <a:masterClrMapping/>
   </p:clrMapOvr>
-  <p:transition xmlns:p14="http://schemas.microsoft.com/office/powerpoint/2010/main" spd="med">
+  <p:transition spd="med">
     <p:fade/>
   </p:transition>
 </p:sld>
@@ -21406,13 +21339,13 @@
   <p:clrMapOvr>
     <a:masterClrMapping/>
   </p:clrMapOvr>
-  <p:transition xmlns:p14="http://schemas.microsoft.com/office/powerpoint/2010/main" spd="med">
+  <p:transition spd="med">
     <p:fade/>
   </p:transition>
   <p:timing>
     <p:tnLst>
       <p:par>
-        <p:cTn xmlns:p14="http://schemas.microsoft.com/office/powerpoint/2010/main" id="1" dur="indefinite" restart="never" nodeType="tmRoot"/>
+        <p:cTn id="1" dur="indefinite" restart="never" nodeType="tmRoot"/>
       </p:par>
     </p:tnLst>
   </p:timing>
@@ -21446,7 +21379,7 @@
   <p:clrMapOvr>
     <a:masterClrMapping/>
   </p:clrMapOvr>
-  <p:transition xmlns:p14="http://schemas.microsoft.com/office/powerpoint/2010/main" spd="med">
+  <p:transition spd="med">
     <p:fade/>
   </p:transition>
 </p:sld>
@@ -21597,7 +21530,7 @@
   <p:clrMapOvr>
     <a:masterClrMapping/>
   </p:clrMapOvr>
-  <p:transition xmlns:p14="http://schemas.microsoft.com/office/powerpoint/2010/main" spd="med">
+  <p:transition spd="med">
     <p:fade/>
   </p:transition>
 </p:sld>
@@ -21682,7 +21615,7 @@
   <p:clrMapOvr>
     <a:masterClrMapping/>
   </p:clrMapOvr>
-  <p:transition xmlns:p14="http://schemas.microsoft.com/office/powerpoint/2010/main" spd="med">
+  <p:transition spd="med">
     <p:fade/>
   </p:transition>
 </p:sld>
@@ -21919,13 +21852,18 @@
         </p:nvCxnSpPr>
         <p:spPr>
           <a:xfrm flipH="1">
-            <a:off x="13652499" y="4508500"/>
-            <a:ext cx="1828800" cy="0"/>
+            <a:off x="13465176" y="1832385"/>
+            <a:ext cx="2266948" cy="2253506"/>
           </a:xfrm>
           <a:prstGeom prst="straightConnector1">
             <a:avLst/>
           </a:prstGeom>
-          <a:ln>
+          <a:ln w="127000" cap="rnd">
+            <a:solidFill>
+              <a:schemeClr val="tx2"/>
+            </a:solidFill>
+            <a:round/>
+            <a:headEnd type="oval"/>
             <a:tailEnd type="arrow"/>
           </a:ln>
         </p:spPr>
@@ -21954,7 +21892,7 @@
   <p:clrMapOvr>
     <a:masterClrMapping/>
   </p:clrMapOvr>
-  <p:transition xmlns:p14="http://schemas.microsoft.com/office/powerpoint/2010/main" spd="med">
+  <p:transition spd="med">
     <p:fade/>
   </p:transition>
 </p:sld>
@@ -22217,14 +22155,15 @@
         </p:nvCxnSpPr>
         <p:spPr>
           <a:xfrm flipH="1">
-            <a:off x="12144374" y="6492875"/>
-            <a:ext cx="1828800" cy="0"/>
+            <a:off x="11935828" y="1133475"/>
+            <a:ext cx="1956635" cy="5327316"/>
           </a:xfrm>
           <a:prstGeom prst="straightConnector1">
             <a:avLst/>
           </a:prstGeom>
-          <a:ln>
-            <a:tailEnd type="arrow"/>
+          <a:ln w="127000">
+            <a:headEnd type="oval"/>
+            <a:tailEnd type="stealth"/>
           </a:ln>
         </p:spPr>
         <p:style>
@@ -22252,7 +22191,7 @@
   <p:clrMapOvr>
     <a:masterClrMapping/>
   </p:clrMapOvr>
-  <p:transition xmlns:p14="http://schemas.microsoft.com/office/powerpoint/2010/main" spd="med">
+  <p:transition spd="med">
     <p:fade/>
   </p:transition>
 </p:sld>
@@ -22545,13 +22484,14 @@
         </p:nvCxnSpPr>
         <p:spPr>
           <a:xfrm flipH="1">
-            <a:off x="14106524" y="4533900"/>
-            <a:ext cx="1828800" cy="0"/>
+            <a:off x="13475368" y="1716505"/>
+            <a:ext cx="1010654" cy="2646948"/>
           </a:xfrm>
           <a:prstGeom prst="straightConnector1">
             <a:avLst/>
           </a:prstGeom>
-          <a:ln>
+          <a:ln w="127000">
+            <a:headEnd type="oval"/>
             <a:tailEnd type="arrow"/>
           </a:ln>
         </p:spPr>
@@ -22577,14 +22517,15 @@
           <p:nvPr/>
         </p:nvCxnSpPr>
         <p:spPr>
-          <a:xfrm flipH="1">
-            <a:off x="14100174" y="5384800"/>
-            <a:ext cx="1828800" cy="0"/>
+          <a:xfrm>
+            <a:off x="13363074" y="4789572"/>
+            <a:ext cx="368970" cy="424113"/>
           </a:xfrm>
           <a:prstGeom prst="straightConnector1">
             <a:avLst/>
           </a:prstGeom>
-          <a:ln>
+          <a:ln w="63500">
+            <a:headEnd type="oval"/>
             <a:tailEnd type="arrow"/>
           </a:ln>
         </p:spPr>
@@ -22613,7 +22554,7 @@
   <p:clrMapOvr>
     <a:masterClrMapping/>
   </p:clrMapOvr>
-  <p:transition xmlns:p14="http://schemas.microsoft.com/office/powerpoint/2010/main" spd="med">
+  <p:transition spd="med">
     <p:fade/>
   </p:transition>
 </p:sld>
@@ -22711,7 +22652,7 @@
   <p:clrMapOvr>
     <a:masterClrMapping/>
   </p:clrMapOvr>
-  <p:transition xmlns:p14="http://schemas.microsoft.com/office/powerpoint/2010/main" spd="med">
+  <p:transition spd="med">
     <p:fade/>
   </p:transition>
 </p:sld>
@@ -23093,7 +23034,7 @@
   <a:extraClrSchemeLst/>
   <a:extLst>
     <a:ext uri="{05A4C25C-085E-4340-85A3-A5531E510DB2}">
-      <thm15:themeFamily xmlns:thm15="http://schemas.microsoft.com/office/thememl/2012/main" xmlns="" name="Chef-TemplateComps_v09-16x9-Light.potx" id="{078CEFDB-FA7A-4E36-9964-13EF367585CB}" vid="{8B87B0F3-7308-43D5-8388-E1B49EA02652}"/>
+      <thm15:themeFamily xmlns:thm15="http://schemas.microsoft.com/office/thememl/2012/main" name="Chef-TemplateComps_v09-16x9-Light.potx" id="{078CEFDB-FA7A-4E36-9964-13EF367585CB}" vid="{8B87B0F3-7308-43D5-8388-E1B49EA02652}"/>
     </a:ext>
   </a:extLst>
 </a:theme>
@@ -23475,7 +23416,7 @@
   <a:extraClrSchemeLst/>
   <a:extLst>
     <a:ext uri="{05A4C25C-085E-4340-85A3-A5531E510DB2}">
-      <thm15:themeFamily xmlns:thm15="http://schemas.microsoft.com/office/thememl/2012/main" xmlns="" name="Chef-TemplateComps_v09-16x9-Light.potx" id="{078CEFDB-FA7A-4E36-9964-13EF367585CB}" vid="{8B87B0F3-7308-43D5-8388-E1B49EA02652}"/>
+      <thm15:themeFamily xmlns:thm15="http://schemas.microsoft.com/office/thememl/2012/main" name="Chef-TemplateComps_v09-16x9-Light.potx" id="{078CEFDB-FA7A-4E36-9964-13EF367585CB}" vid="{8B87B0F3-7308-43D5-8388-E1B49EA02652}"/>
     </a:ext>
   </a:extLst>
 </a:theme>

</xml_diff>